<commit_message>
refinements toevents and state machines
</commit_message>
<xml_diff>
--- a/week_7/slides.pptx
+++ b/week_7/slides.pptx
@@ -6,6 +6,7 @@
   </p:sldMasterIdLst>
   <p:sldIdLst>
     <p:sldId id="256" r:id="rId2"/>
+    <p:sldId id="257" r:id="rId3"/>
   </p:sldIdLst>
   <p:sldSz cx="12192000" cy="6858000"/>
   <p:notesSz cx="6858000" cy="9144000"/>
@@ -4016,6 +4017,756 @@
 </p:sld>
 </file>
 
+<file path=ppt/slides/slide2.xml><?xml version="1.0" encoding="utf-8"?>
+<p:sld xmlns:a="http://schemas.openxmlformats.org/drawingml/2006/main" xmlns:r="http://schemas.openxmlformats.org/officeDocument/2006/relationships" xmlns:p="http://schemas.openxmlformats.org/presentationml/2006/main">
+  <p:cSld>
+    <p:spTree>
+      <p:nvGrpSpPr>
+        <p:cNvPr id="1" name=""/>
+        <p:cNvGrpSpPr/>
+        <p:nvPr/>
+      </p:nvGrpSpPr>
+      <p:grpSpPr>
+        <a:xfrm>
+          <a:off x="0" y="0"/>
+          <a:ext cx="0" cy="0"/>
+          <a:chOff x="0" y="0"/>
+          <a:chExt cx="0" cy="0"/>
+        </a:xfrm>
+      </p:grpSpPr>
+      <p:sp>
+        <p:nvSpPr>
+          <p:cNvPr id="4" name="Rounded Rectangle 3"/>
+          <p:cNvSpPr/>
+          <p:nvPr/>
+        </p:nvSpPr>
+        <p:spPr>
+          <a:xfrm>
+            <a:off x="1888717" y="1798840"/>
+            <a:ext cx="1617785" cy="832339"/>
+          </a:xfrm>
+          <a:prstGeom prst="roundRect">
+            <a:avLst/>
+          </a:prstGeom>
+        </p:spPr>
+        <p:style>
+          <a:lnRef idx="2">
+            <a:schemeClr val="accent1">
+              <a:shade val="50000"/>
+            </a:schemeClr>
+          </a:lnRef>
+          <a:fillRef idx="1">
+            <a:schemeClr val="accent1"/>
+          </a:fillRef>
+          <a:effectRef idx="0">
+            <a:schemeClr val="accent1"/>
+          </a:effectRef>
+          <a:fontRef idx="minor">
+            <a:schemeClr val="lt1"/>
+          </a:fontRef>
+        </p:style>
+        <p:txBody>
+          <a:bodyPr rtlCol="0" anchor="ctr"/>
+          <a:lstStyle/>
+          <a:p>
+            <a:pPr algn="ctr"/>
+            <a:r>
+              <a:rPr lang="en-US" dirty="0" smtClean="0"/>
+              <a:t>Door Closed</a:t>
+            </a:r>
+          </a:p>
+          <a:p>
+            <a:pPr algn="ctr"/>
+            <a:r>
+              <a:rPr lang="en-US" dirty="0" smtClean="0"/>
+              <a:t>Off</a:t>
+            </a:r>
+            <a:endParaRPr lang="en-US" dirty="0"/>
+          </a:p>
+        </p:txBody>
+      </p:sp>
+      <p:sp>
+        <p:nvSpPr>
+          <p:cNvPr id="5" name="Rounded Rectangle 4"/>
+          <p:cNvSpPr/>
+          <p:nvPr/>
+        </p:nvSpPr>
+        <p:spPr>
+          <a:xfrm>
+            <a:off x="6472439" y="1798840"/>
+            <a:ext cx="1617785" cy="832339"/>
+          </a:xfrm>
+          <a:prstGeom prst="roundRect">
+            <a:avLst/>
+          </a:prstGeom>
+        </p:spPr>
+        <p:style>
+          <a:lnRef idx="2">
+            <a:schemeClr val="accent1">
+              <a:shade val="50000"/>
+            </a:schemeClr>
+          </a:lnRef>
+          <a:fillRef idx="1">
+            <a:schemeClr val="accent1"/>
+          </a:fillRef>
+          <a:effectRef idx="0">
+            <a:schemeClr val="accent1"/>
+          </a:effectRef>
+          <a:fontRef idx="minor">
+            <a:schemeClr val="lt1"/>
+          </a:fontRef>
+        </p:style>
+        <p:txBody>
+          <a:bodyPr rtlCol="0" anchor="ctr"/>
+          <a:lstStyle/>
+          <a:p>
+            <a:pPr algn="ctr"/>
+            <a:r>
+              <a:rPr lang="en-US" dirty="0" smtClean="0"/>
+              <a:t>Door Closed</a:t>
+            </a:r>
+          </a:p>
+          <a:p>
+            <a:pPr algn="ctr"/>
+            <a:r>
+              <a:rPr lang="en-US" dirty="0" smtClean="0"/>
+              <a:t>On</a:t>
+            </a:r>
+            <a:endParaRPr lang="en-US" dirty="0"/>
+          </a:p>
+        </p:txBody>
+      </p:sp>
+      <p:sp>
+        <p:nvSpPr>
+          <p:cNvPr id="6" name="Rounded Rectangle 5"/>
+          <p:cNvSpPr/>
+          <p:nvPr/>
+        </p:nvSpPr>
+        <p:spPr>
+          <a:xfrm>
+            <a:off x="4257022" y="3752950"/>
+            <a:ext cx="1594095" cy="718751"/>
+          </a:xfrm>
+          <a:prstGeom prst="roundRect">
+            <a:avLst/>
+          </a:prstGeom>
+        </p:spPr>
+        <p:style>
+          <a:lnRef idx="2">
+            <a:schemeClr val="accent1">
+              <a:shade val="50000"/>
+            </a:schemeClr>
+          </a:lnRef>
+          <a:fillRef idx="1">
+            <a:schemeClr val="accent1"/>
+          </a:fillRef>
+          <a:effectRef idx="0">
+            <a:schemeClr val="accent1"/>
+          </a:effectRef>
+          <a:fontRef idx="minor">
+            <a:schemeClr val="lt1"/>
+          </a:fontRef>
+        </p:style>
+        <p:txBody>
+          <a:bodyPr rtlCol="0" anchor="ctr"/>
+          <a:lstStyle/>
+          <a:p>
+            <a:pPr algn="ctr"/>
+            <a:r>
+              <a:rPr lang="en-US" dirty="0" smtClean="0"/>
+              <a:t>Door Open</a:t>
+            </a:r>
+            <a:endParaRPr lang="en-US" dirty="0"/>
+          </a:p>
+        </p:txBody>
+      </p:sp>
+      <p:sp>
+        <p:nvSpPr>
+          <p:cNvPr id="10" name="TextBox 9"/>
+          <p:cNvSpPr txBox="1"/>
+          <p:nvPr/>
+        </p:nvSpPr>
+        <p:spPr>
+          <a:xfrm>
+            <a:off x="3584629" y="2184448"/>
+            <a:ext cx="2773260" cy="369332"/>
+          </a:xfrm>
+          <a:prstGeom prst="rect">
+            <a:avLst/>
+          </a:prstGeom>
+          <a:noFill/>
+        </p:spPr>
+        <p:txBody>
+          <a:bodyPr wrap="none" rtlCol="0">
+            <a:spAutoFit/>
+          </a:bodyPr>
+          <a:lstStyle/>
+          <a:p>
+            <a:r>
+              <a:rPr lang="en-US" smtClean="0"/>
+              <a:t>On button pressed: emit on</a:t>
+            </a:r>
+            <a:endParaRPr lang="en-US"/>
+          </a:p>
+        </p:txBody>
+      </p:sp>
+      <p:cxnSp>
+        <p:nvCxnSpPr>
+          <p:cNvPr id="15" name="Elbow Connector 14"/>
+          <p:cNvCxnSpPr>
+            <a:stCxn id="4" idx="3"/>
+            <a:endCxn id="5" idx="1"/>
+          </p:cNvCxnSpPr>
+          <p:nvPr/>
+        </p:nvCxnSpPr>
+        <p:spPr>
+          <a:xfrm>
+            <a:off x="3506502" y="2215010"/>
+            <a:ext cx="2965937" cy="0"/>
+          </a:xfrm>
+          <a:prstGeom prst="bentConnector3">
+            <a:avLst/>
+          </a:prstGeom>
+          <a:ln w="22225">
+            <a:tailEnd type="triangle"/>
+          </a:ln>
+        </p:spPr>
+        <p:style>
+          <a:lnRef idx="1">
+            <a:schemeClr val="accent1"/>
+          </a:lnRef>
+          <a:fillRef idx="0">
+            <a:schemeClr val="accent1"/>
+          </a:fillRef>
+          <a:effectRef idx="0">
+            <a:schemeClr val="accent1"/>
+          </a:effectRef>
+          <a:fontRef idx="minor">
+            <a:schemeClr val="tx1"/>
+          </a:fontRef>
+        </p:style>
+      </p:cxnSp>
+      <p:cxnSp>
+        <p:nvCxnSpPr>
+          <p:cNvPr id="17" name="Elbow Connector 16"/>
+          <p:cNvCxnSpPr>
+            <a:stCxn id="4" idx="2"/>
+          </p:cNvCxnSpPr>
+          <p:nvPr/>
+        </p:nvCxnSpPr>
+        <p:spPr>
+          <a:xfrm rot="16200000" flipH="1">
+            <a:off x="2753295" y="2575494"/>
+            <a:ext cx="1424352" cy="1535722"/>
+          </a:xfrm>
+          <a:prstGeom prst="bentConnector2">
+            <a:avLst/>
+          </a:prstGeom>
+          <a:ln w="22225">
+            <a:tailEnd type="triangle"/>
+          </a:ln>
+        </p:spPr>
+        <p:style>
+          <a:lnRef idx="1">
+            <a:schemeClr val="accent1"/>
+          </a:lnRef>
+          <a:fillRef idx="0">
+            <a:schemeClr val="accent1"/>
+          </a:fillRef>
+          <a:effectRef idx="0">
+            <a:schemeClr val="accent1"/>
+          </a:effectRef>
+          <a:fontRef idx="minor">
+            <a:schemeClr val="tx1"/>
+          </a:fontRef>
+        </p:style>
+      </p:cxnSp>
+      <p:cxnSp>
+        <p:nvCxnSpPr>
+          <p:cNvPr id="20" name="Elbow Connector 19"/>
+          <p:cNvCxnSpPr>
+            <a:stCxn id="5" idx="2"/>
+            <a:endCxn id="6" idx="3"/>
+          </p:cNvCxnSpPr>
+          <p:nvPr/>
+        </p:nvCxnSpPr>
+        <p:spPr>
+          <a:xfrm rot="5400000">
+            <a:off x="5825652" y="2656645"/>
+            <a:ext cx="1481147" cy="1430215"/>
+          </a:xfrm>
+          <a:prstGeom prst="bentConnector2">
+            <a:avLst/>
+          </a:prstGeom>
+          <a:ln w="22225">
+            <a:tailEnd type="triangle"/>
+          </a:ln>
+        </p:spPr>
+        <p:style>
+          <a:lnRef idx="1">
+            <a:schemeClr val="accent1"/>
+          </a:lnRef>
+          <a:fillRef idx="0">
+            <a:schemeClr val="accent1"/>
+          </a:fillRef>
+          <a:effectRef idx="0">
+            <a:schemeClr val="accent1"/>
+          </a:effectRef>
+          <a:fontRef idx="minor">
+            <a:schemeClr val="tx1"/>
+          </a:fontRef>
+        </p:style>
+      </p:cxnSp>
+      <p:cxnSp>
+        <p:nvCxnSpPr>
+          <p:cNvPr id="23" name="Elbow Connector 22"/>
+          <p:cNvCxnSpPr>
+            <a:stCxn id="5" idx="0"/>
+            <a:endCxn id="4" idx="0"/>
+          </p:cNvCxnSpPr>
+          <p:nvPr/>
+        </p:nvCxnSpPr>
+        <p:spPr>
+          <a:xfrm rot="16200000" flipV="1">
+            <a:off x="4989471" y="-493021"/>
+            <a:ext cx="12700" cy="4583722"/>
+          </a:xfrm>
+          <a:prstGeom prst="bentConnector3">
+            <a:avLst>
+              <a:gd name="adj1" fmla="val 4292315"/>
+            </a:avLst>
+          </a:prstGeom>
+          <a:ln w="22225">
+            <a:tailEnd type="triangle"/>
+          </a:ln>
+        </p:spPr>
+        <p:style>
+          <a:lnRef idx="1">
+            <a:schemeClr val="accent1"/>
+          </a:lnRef>
+          <a:fillRef idx="0">
+            <a:schemeClr val="accent1"/>
+          </a:fillRef>
+          <a:effectRef idx="0">
+            <a:schemeClr val="accent1"/>
+          </a:effectRef>
+          <a:fontRef idx="minor">
+            <a:schemeClr val="tx1"/>
+          </a:fontRef>
+        </p:style>
+      </p:cxnSp>
+      <p:sp>
+        <p:nvSpPr>
+          <p:cNvPr id="27" name="TextBox 26"/>
+          <p:cNvSpPr txBox="1"/>
+          <p:nvPr/>
+        </p:nvSpPr>
+        <p:spPr>
+          <a:xfrm>
+            <a:off x="3567445" y="1235318"/>
+            <a:ext cx="2807628" cy="369332"/>
+          </a:xfrm>
+          <a:prstGeom prst="rect">
+            <a:avLst/>
+          </a:prstGeom>
+          <a:noFill/>
+        </p:spPr>
+        <p:txBody>
+          <a:bodyPr wrap="none" rtlCol="0">
+            <a:spAutoFit/>
+          </a:bodyPr>
+          <a:lstStyle/>
+          <a:p>
+            <a:r>
+              <a:rPr lang="en-US" dirty="0" smtClean="0"/>
+              <a:t>Off button pressed: emit off</a:t>
+            </a:r>
+            <a:endParaRPr lang="en-US" dirty="0"/>
+          </a:p>
+        </p:txBody>
+      </p:sp>
+      <p:sp>
+        <p:nvSpPr>
+          <p:cNvPr id="40" name="Arc 39"/>
+          <p:cNvSpPr/>
+          <p:nvPr/>
+        </p:nvSpPr>
+        <p:spPr>
+          <a:xfrm>
+            <a:off x="1234983" y="1792489"/>
+            <a:ext cx="939149" cy="860832"/>
+          </a:xfrm>
+          <a:prstGeom prst="arc">
+            <a:avLst>
+              <a:gd name="adj1" fmla="val 3561012"/>
+              <a:gd name="adj2" fmla="val 17802639"/>
+            </a:avLst>
+          </a:prstGeom>
+          <a:ln w="22225">
+            <a:tailEnd type="triangle"/>
+          </a:ln>
+        </p:spPr>
+        <p:style>
+          <a:lnRef idx="1">
+            <a:schemeClr val="accent1"/>
+          </a:lnRef>
+          <a:fillRef idx="0">
+            <a:schemeClr val="accent1"/>
+          </a:fillRef>
+          <a:effectRef idx="0">
+            <a:schemeClr val="accent1"/>
+          </a:effectRef>
+          <a:fontRef idx="minor">
+            <a:schemeClr val="tx1"/>
+          </a:fontRef>
+        </p:style>
+        <p:txBody>
+          <a:bodyPr rtlCol="0" anchor="ctr"/>
+          <a:lstStyle/>
+          <a:p>
+            <a:pPr algn="ctr"/>
+            <a:endParaRPr lang="en-US"/>
+          </a:p>
+        </p:txBody>
+      </p:sp>
+      <p:sp>
+        <p:nvSpPr>
+          <p:cNvPr id="41" name="Arc 40"/>
+          <p:cNvSpPr/>
+          <p:nvPr/>
+        </p:nvSpPr>
+        <p:spPr>
+          <a:xfrm rot="16200000">
+            <a:off x="4572650" y="4263454"/>
+            <a:ext cx="939149" cy="860832"/>
+          </a:xfrm>
+          <a:prstGeom prst="arc">
+            <a:avLst>
+              <a:gd name="adj1" fmla="val 3561012"/>
+              <a:gd name="adj2" fmla="val 18042358"/>
+            </a:avLst>
+          </a:prstGeom>
+          <a:ln w="22225">
+            <a:tailEnd type="triangle"/>
+          </a:ln>
+        </p:spPr>
+        <p:style>
+          <a:lnRef idx="1">
+            <a:schemeClr val="accent1"/>
+          </a:lnRef>
+          <a:fillRef idx="0">
+            <a:schemeClr val="accent1"/>
+          </a:fillRef>
+          <a:effectRef idx="0">
+            <a:schemeClr val="accent1"/>
+          </a:effectRef>
+          <a:fontRef idx="minor">
+            <a:schemeClr val="tx1"/>
+          </a:fontRef>
+        </p:style>
+        <p:txBody>
+          <a:bodyPr rtlCol="0" anchor="ctr"/>
+          <a:lstStyle/>
+          <a:p>
+            <a:pPr algn="ctr"/>
+            <a:endParaRPr lang="en-US"/>
+          </a:p>
+        </p:txBody>
+      </p:sp>
+      <p:sp>
+        <p:nvSpPr>
+          <p:cNvPr id="42" name="TextBox 41"/>
+          <p:cNvSpPr txBox="1"/>
+          <p:nvPr/>
+        </p:nvSpPr>
+        <p:spPr>
+          <a:xfrm>
+            <a:off x="1801149" y="2993030"/>
+            <a:ext cx="902811" cy="646331"/>
+          </a:xfrm>
+          <a:prstGeom prst="rect">
+            <a:avLst/>
+          </a:prstGeom>
+          <a:noFill/>
+        </p:spPr>
+        <p:txBody>
+          <a:bodyPr wrap="none" rtlCol="0">
+            <a:spAutoFit/>
+          </a:bodyPr>
+          <a:lstStyle/>
+          <a:p>
+            <a:pPr algn="r"/>
+            <a:r>
+              <a:rPr lang="en-US" smtClean="0"/>
+              <a:t>Door</a:t>
+            </a:r>
+          </a:p>
+          <a:p>
+            <a:pPr algn="r"/>
+            <a:r>
+              <a:rPr lang="en-US" dirty="0" smtClean="0"/>
+              <a:t>opened</a:t>
+            </a:r>
+            <a:endParaRPr lang="en-US" dirty="0"/>
+          </a:p>
+        </p:txBody>
+      </p:sp>
+      <p:sp>
+        <p:nvSpPr>
+          <p:cNvPr id="43" name="TextBox 42"/>
+          <p:cNvSpPr txBox="1"/>
+          <p:nvPr/>
+        </p:nvSpPr>
+        <p:spPr>
+          <a:xfrm>
+            <a:off x="7287682" y="2993031"/>
+            <a:ext cx="995785" cy="923330"/>
+          </a:xfrm>
+          <a:prstGeom prst="rect">
+            <a:avLst/>
+          </a:prstGeom>
+          <a:noFill/>
+        </p:spPr>
+        <p:txBody>
+          <a:bodyPr wrap="none" rtlCol="0">
+            <a:spAutoFit/>
+          </a:bodyPr>
+          <a:lstStyle/>
+          <a:p>
+            <a:r>
+              <a:rPr lang="en-US" dirty="0" smtClean="0"/>
+              <a:t>Door</a:t>
+            </a:r>
+          </a:p>
+          <a:p>
+            <a:r>
+              <a:rPr lang="en-US" dirty="0" smtClean="0"/>
+              <a:t>opened:</a:t>
+            </a:r>
+          </a:p>
+          <a:p>
+            <a:r>
+              <a:rPr lang="en-US" dirty="0" smtClean="0"/>
+              <a:t>emit off</a:t>
+            </a:r>
+            <a:endParaRPr lang="en-US" dirty="0"/>
+          </a:p>
+        </p:txBody>
+      </p:sp>
+      <p:sp>
+        <p:nvSpPr>
+          <p:cNvPr id="44" name="TextBox 43"/>
+          <p:cNvSpPr txBox="1"/>
+          <p:nvPr/>
+        </p:nvSpPr>
+        <p:spPr>
+          <a:xfrm>
+            <a:off x="5472641" y="4613352"/>
+            <a:ext cx="1603259" cy="369332"/>
+          </a:xfrm>
+          <a:prstGeom prst="rect">
+            <a:avLst/>
+          </a:prstGeom>
+          <a:noFill/>
+        </p:spPr>
+        <p:txBody>
+          <a:bodyPr wrap="none" rtlCol="0">
+            <a:spAutoFit/>
+          </a:bodyPr>
+          <a:lstStyle/>
+          <a:p>
+            <a:r>
+              <a:rPr lang="en-US" smtClean="0"/>
+              <a:t>Power level set</a:t>
+            </a:r>
+            <a:endParaRPr lang="en-US" dirty="0"/>
+          </a:p>
+        </p:txBody>
+      </p:sp>
+      <p:sp>
+        <p:nvSpPr>
+          <p:cNvPr id="45" name="TextBox 44"/>
+          <p:cNvSpPr txBox="1"/>
+          <p:nvPr/>
+        </p:nvSpPr>
+        <p:spPr>
+          <a:xfrm>
+            <a:off x="266116" y="1890603"/>
+            <a:ext cx="956416" cy="646331"/>
+          </a:xfrm>
+          <a:prstGeom prst="rect">
+            <a:avLst/>
+          </a:prstGeom>
+          <a:noFill/>
+        </p:spPr>
+        <p:txBody>
+          <a:bodyPr wrap="none" rtlCol="0">
+            <a:spAutoFit/>
+          </a:bodyPr>
+          <a:lstStyle/>
+          <a:p>
+            <a:pPr algn="r"/>
+            <a:r>
+              <a:rPr lang="en-US" smtClean="0"/>
+              <a:t>Power</a:t>
+            </a:r>
+          </a:p>
+          <a:p>
+            <a:pPr algn="r"/>
+            <a:r>
+              <a:rPr lang="en-US" dirty="0" smtClean="0"/>
+              <a:t>level set</a:t>
+            </a:r>
+            <a:endParaRPr lang="en-US" dirty="0"/>
+          </a:p>
+        </p:txBody>
+      </p:sp>
+      <p:cxnSp>
+        <p:nvCxnSpPr>
+          <p:cNvPr id="51" name="Straight Arrow Connector 50"/>
+          <p:cNvCxnSpPr/>
+          <p:nvPr/>
+        </p:nvCxnSpPr>
+        <p:spPr>
+          <a:xfrm flipH="1" flipV="1">
+            <a:off x="3445933" y="2624831"/>
+            <a:ext cx="811089" cy="1128119"/>
+          </a:xfrm>
+          <a:prstGeom prst="straightConnector1">
+            <a:avLst/>
+          </a:prstGeom>
+          <a:ln w="22225">
+            <a:tailEnd type="triangle"/>
+          </a:ln>
+        </p:spPr>
+        <p:style>
+          <a:lnRef idx="1">
+            <a:schemeClr val="accent1"/>
+          </a:lnRef>
+          <a:fillRef idx="0">
+            <a:schemeClr val="accent1"/>
+          </a:fillRef>
+          <a:effectRef idx="0">
+            <a:schemeClr val="accent1"/>
+          </a:effectRef>
+          <a:fontRef idx="minor">
+            <a:schemeClr val="tx1"/>
+          </a:fontRef>
+        </p:style>
+      </p:cxnSp>
+      <p:sp>
+        <p:nvSpPr>
+          <p:cNvPr id="59" name="TextBox 58"/>
+          <p:cNvSpPr txBox="1"/>
+          <p:nvPr/>
+        </p:nvSpPr>
+        <p:spPr>
+          <a:xfrm>
+            <a:off x="3800163" y="2839721"/>
+            <a:ext cx="995785" cy="646331"/>
+          </a:xfrm>
+          <a:prstGeom prst="rect">
+            <a:avLst/>
+          </a:prstGeom>
+          <a:noFill/>
+        </p:spPr>
+        <p:txBody>
+          <a:bodyPr wrap="none" rtlCol="0">
+            <a:spAutoFit/>
+          </a:bodyPr>
+          <a:lstStyle/>
+          <a:p>
+            <a:r>
+              <a:rPr lang="en-US" dirty="0" smtClean="0"/>
+              <a:t>Door</a:t>
+            </a:r>
+          </a:p>
+          <a:p>
+            <a:r>
+              <a:rPr lang="en-US" dirty="0" smtClean="0"/>
+              <a:t>    closed</a:t>
+            </a:r>
+            <a:endParaRPr lang="en-US" dirty="0"/>
+          </a:p>
+        </p:txBody>
+      </p:sp>
+      <p:cxnSp>
+        <p:nvCxnSpPr>
+          <p:cNvPr id="60" name="Straight Arrow Connector 59"/>
+          <p:cNvCxnSpPr/>
+          <p:nvPr/>
+        </p:nvCxnSpPr>
+        <p:spPr>
+          <a:xfrm>
+            <a:off x="1704557" y="1092200"/>
+            <a:ext cx="686319" cy="678147"/>
+          </a:xfrm>
+          <a:prstGeom prst="straightConnector1">
+            <a:avLst/>
+          </a:prstGeom>
+          <a:ln w="22225">
+            <a:tailEnd type="triangle"/>
+          </a:ln>
+        </p:spPr>
+        <p:style>
+          <a:lnRef idx="1">
+            <a:schemeClr val="accent1"/>
+          </a:lnRef>
+          <a:fillRef idx="0">
+            <a:schemeClr val="accent1"/>
+          </a:fillRef>
+          <a:effectRef idx="0">
+            <a:schemeClr val="accent1"/>
+          </a:effectRef>
+          <a:fontRef idx="minor">
+            <a:schemeClr val="tx1"/>
+          </a:fontRef>
+        </p:style>
+      </p:cxnSp>
+      <p:sp>
+        <p:nvSpPr>
+          <p:cNvPr id="64" name="TextBox 63"/>
+          <p:cNvSpPr txBox="1"/>
+          <p:nvPr/>
+        </p:nvSpPr>
+        <p:spPr>
+          <a:xfrm>
+            <a:off x="1256364" y="1191653"/>
+            <a:ext cx="632353" cy="369332"/>
+          </a:xfrm>
+          <a:prstGeom prst="rect">
+            <a:avLst/>
+          </a:prstGeom>
+          <a:noFill/>
+        </p:spPr>
+        <p:txBody>
+          <a:bodyPr wrap="none" rtlCol="0">
+            <a:spAutoFit/>
+          </a:bodyPr>
+          <a:lstStyle/>
+          <a:p>
+            <a:pPr algn="r"/>
+            <a:r>
+              <a:rPr lang="en-US" smtClean="0"/>
+              <a:t>Start</a:t>
+            </a:r>
+            <a:endParaRPr lang="en-US" dirty="0"/>
+          </a:p>
+        </p:txBody>
+      </p:sp>
+    </p:spTree>
+    <p:extLst>
+      <p:ext uri="{BB962C8B-B14F-4D97-AF65-F5344CB8AC3E}">
+        <p14:creationId xmlns:p14="http://schemas.microsoft.com/office/powerpoint/2010/main" val="1862472888"/>
+      </p:ext>
+    </p:extLst>
+  </p:cSld>
+  <p:clrMapOvr>
+    <a:masterClrMapping/>
+  </p:clrMapOvr>
+</p:sld>
+</file>
+
 <file path=ppt/theme/theme1.xml><?xml version="1.0" encoding="utf-8"?>
 <a:theme xmlns:a="http://schemas.openxmlformats.org/drawingml/2006/main" name="Office Theme">
   <a:themeElements>

</xml_diff>

<commit_message>
new transition in robot
</commit_message>
<xml_diff>
--- a/week_7/slides.pptx
+++ b/week_7/slides.pptx
@@ -6241,16 +6241,54 @@
           </a:p>
         </p:txBody>
       </p:sp>
-      <p:sp>
-        <p:nvSpPr>
-          <p:cNvPr id="52" name="TextBox 51"/>
+      <p:cxnSp>
+        <p:nvCxnSpPr>
+          <p:cNvPr id="53" name="Elbow Connector 52"/>
+          <p:cNvCxnSpPr>
+            <a:stCxn id="6" idx="0"/>
+            <a:endCxn id="5" idx="2"/>
+          </p:cNvCxnSpPr>
+          <p:nvPr/>
+        </p:nvCxnSpPr>
+        <p:spPr>
+          <a:xfrm rot="5400000" flipH="1" flipV="1">
+            <a:off x="3414346" y="3040509"/>
+            <a:ext cx="1665328" cy="12700"/>
+          </a:xfrm>
+          <a:prstGeom prst="bentConnector3">
+            <a:avLst>
+              <a:gd name="adj1" fmla="val 50000"/>
+            </a:avLst>
+          </a:prstGeom>
+          <a:ln w="22225">
+            <a:tailEnd type="triangle"/>
+          </a:ln>
+        </p:spPr>
+        <p:style>
+          <a:lnRef idx="1">
+            <a:schemeClr val="accent1"/>
+          </a:lnRef>
+          <a:fillRef idx="0">
+            <a:schemeClr val="accent1"/>
+          </a:fillRef>
+          <a:effectRef idx="0">
+            <a:schemeClr val="accent1"/>
+          </a:effectRef>
+          <a:fontRef idx="minor">
+            <a:schemeClr val="tx1"/>
+          </a:fontRef>
+        </p:style>
+      </p:cxnSp>
+      <p:sp>
+        <p:nvSpPr>
+          <p:cNvPr id="57" name="TextBox 56"/>
           <p:cNvSpPr txBox="1"/>
           <p:nvPr/>
         </p:nvSpPr>
         <p:spPr>
           <a:xfrm>
-            <a:off x="10744200" y="1473200"/>
-            <a:ext cx="184731" cy="369332"/>
+            <a:off x="4215368" y="2855842"/>
+            <a:ext cx="1461205" cy="369332"/>
           </a:xfrm>
           <a:prstGeom prst="rect">
             <a:avLst/>
@@ -6258,12 +6296,17 @@
           <a:noFill/>
         </p:spPr>
         <p:txBody>
-          <a:bodyPr wrap="none" rtlCol="0">
+          <a:bodyPr wrap="square" rtlCol="0">
             <a:spAutoFit/>
           </a:bodyPr>
           <a:lstStyle/>
           <a:p>
-            <a:endParaRPr lang="en-US"/>
+            <a:pPr algn="ctr"/>
+            <a:r>
+              <a:rPr lang="en-US" smtClean="0"/>
+              <a:t>battery low</a:t>
+            </a:r>
+            <a:endParaRPr lang="en-US" dirty="0"/>
           </a:p>
         </p:txBody>
       </p:sp>

</xml_diff>